<commit_message>
updates for first 1/2 of css class
</commit_message>
<xml_diff>
--- a/css/1_class-1-intro/IntroductionClass1.pptx
+++ b/css/1_class-1-intro/IntroductionClass1.pptx
@@ -10411,21 +10411,6 @@
 </file>
 
 <file path=customXml/item1.xml><?xml version="1.0" encoding="utf-8"?>
-<?mso-contentType ?>
-<FormTemplates xmlns="http://schemas.microsoft.com/sharepoint/v3/contenttype/forms">
-  <Display>DocumentLibraryForm</Display>
-  <Edit>DocumentLibraryForm</Edit>
-  <New>DocumentLibraryForm</New>
-</FormTemplates>
-</file>
-
-<file path=customXml/item2.xml><?xml version="1.0" encoding="utf-8"?>
-<p:properties xmlns:p="http://schemas.microsoft.com/office/2006/metadata/properties" xmlns:xsi="http://www.w3.org/2001/XMLSchema-instance" xmlns:pc="http://schemas.microsoft.com/office/infopath/2007/PartnerControls">
-  <documentManagement/>
-</p:properties>
-</file>
-
-<file path=customXml/item3.xml><?xml version="1.0" encoding="utf-8"?>
 <ct:contentTypeSchema xmlns:ct="http://schemas.microsoft.com/office/2006/metadata/contentType" xmlns:ma="http://schemas.microsoft.com/office/2006/metadata/properties/metaAttributes" ct:_="" ma:_="" ma:contentTypeName="Document" ma:contentTypeID="0x010100F2E712110C0FCA45A92C88A6AA517C56" ma:contentTypeVersion="7" ma:contentTypeDescription="Create a new document." ma:contentTypeScope="" ma:versionID="347b19dbfea501a665fc2554bfe99ab8">
   <xsd:schema xmlns:xsd="http://www.w3.org/2001/XMLSchema" xmlns:xs="http://www.w3.org/2001/XMLSchema" xmlns:p="http://schemas.microsoft.com/office/2006/metadata/properties" xmlns:ns2="0ad9ea8a-6a6b-4606-a768-75fd72d63d7e" targetNamespace="http://schemas.microsoft.com/office/2006/metadata/properties" ma:root="true" ma:fieldsID="063751f1d368749696661a2fc6292abe" ns2:_="">
     <xsd:import namespace="0ad9ea8a-6a6b-4606-a768-75fd72d63d7e"/>
@@ -10589,10 +10574,35 @@
 </ct:contentTypeSchema>
 </file>
 
+<file path=customXml/item2.xml><?xml version="1.0" encoding="utf-8"?>
+<p:properties xmlns:p="http://schemas.microsoft.com/office/2006/metadata/properties" xmlns:xsi="http://www.w3.org/2001/XMLSchema-instance" xmlns:pc="http://schemas.microsoft.com/office/infopath/2007/PartnerControls">
+  <documentManagement/>
+</p:properties>
+</file>
+
+<file path=customXml/item3.xml><?xml version="1.0" encoding="utf-8"?>
+<?mso-contentType ?>
+<FormTemplates xmlns="http://schemas.microsoft.com/sharepoint/v3/contenttype/forms">
+  <Display>DocumentLibraryForm</Display>
+  <Edit>DocumentLibraryForm</Edit>
+  <New>DocumentLibraryForm</New>
+</FormTemplates>
+</file>
+
 <file path=customXml/itemProps1.xml><?xml version="1.0" encoding="utf-8"?>
-<ds:datastoreItem xmlns:ds="http://schemas.openxmlformats.org/officeDocument/2006/customXml" ds:itemID="{C95FFCEC-4E62-42A1-B0E9-43C57BCD9CFD}">
+<ds:datastoreItem xmlns:ds="http://schemas.openxmlformats.org/officeDocument/2006/customXml" ds:itemID="{6D907F7C-2477-493B-95CB-ED11537D256E}">
   <ds:schemaRefs>
-    <ds:schemaRef ds:uri="http://schemas.microsoft.com/sharepoint/v3/contenttype/forms"/>
+    <ds:schemaRef ds:uri="http://schemas.microsoft.com/office/2006/metadata/contentType"/>
+    <ds:schemaRef ds:uri="http://schemas.microsoft.com/office/2006/metadata/properties/metaAttributes"/>
+    <ds:schemaRef ds:uri="http://www.w3.org/2001/XMLSchema"/>
+    <ds:schemaRef ds:uri="http://schemas.microsoft.com/office/2006/metadata/properties"/>
+    <ds:schemaRef ds:uri="0ad9ea8a-6a6b-4606-a768-75fd72d63d7e"/>
+    <ds:schemaRef ds:uri="http://schemas.microsoft.com/office/2006/documentManagement/types"/>
+    <ds:schemaRef ds:uri="http://schemas.microsoft.com/office/infopath/2007/PartnerControls"/>
+    <ds:schemaRef ds:uri="http://schemas.openxmlformats.org/package/2006/metadata/core-properties"/>
+    <ds:schemaRef ds:uri="http://purl.org/dc/elements/1.1/"/>
+    <ds:schemaRef ds:uri="http://purl.org/dc/terms/"/>
+    <ds:schemaRef ds:uri="http://schemas.microsoft.com/internal/obd"/>
   </ds:schemaRefs>
 </ds:datastoreItem>
 </file>
@@ -10614,19 +10624,9 @@
 </file>
 
 <file path=customXml/itemProps3.xml><?xml version="1.0" encoding="utf-8"?>
-<ds:datastoreItem xmlns:ds="http://schemas.openxmlformats.org/officeDocument/2006/customXml" ds:itemID="{6D907F7C-2477-493B-95CB-ED11537D256E}">
+<ds:datastoreItem xmlns:ds="http://schemas.openxmlformats.org/officeDocument/2006/customXml" ds:itemID="{C95FFCEC-4E62-42A1-B0E9-43C57BCD9CFD}">
   <ds:schemaRefs>
-    <ds:schemaRef ds:uri="http://schemas.microsoft.com/office/2006/metadata/contentType"/>
-    <ds:schemaRef ds:uri="http://schemas.microsoft.com/office/2006/metadata/properties/metaAttributes"/>
-    <ds:schemaRef ds:uri="http://www.w3.org/2001/XMLSchema"/>
-    <ds:schemaRef ds:uri="http://schemas.microsoft.com/office/2006/metadata/properties"/>
-    <ds:schemaRef ds:uri="0ad9ea8a-6a6b-4606-a768-75fd72d63d7e"/>
-    <ds:schemaRef ds:uri="http://schemas.microsoft.com/office/2006/documentManagement/types"/>
-    <ds:schemaRef ds:uri="http://schemas.microsoft.com/office/infopath/2007/PartnerControls"/>
-    <ds:schemaRef ds:uri="http://schemas.openxmlformats.org/package/2006/metadata/core-properties"/>
-    <ds:schemaRef ds:uri="http://purl.org/dc/elements/1.1/"/>
-    <ds:schemaRef ds:uri="http://purl.org/dc/terms/"/>
-    <ds:schemaRef ds:uri="http://schemas.microsoft.com/internal/obd"/>
+    <ds:schemaRef ds:uri="http://schemas.microsoft.com/sharepoint/v3/contenttype/forms"/>
   </ds:schemaRefs>
 </ds:datastoreItem>
 </file>
</xml_diff>